<commit_message>
Update client states for report
</commit_message>
<xml_diff>
--- a/Client States.pptx
+++ b/Client States.pptx
@@ -104,6 +104,11 @@
       </a:defRPr>
     </a:lvl9pPr>
   </p:defaultTextStyle>
+  <p:extLst>
+    <p:ext uri="{EFAFB233-063F-42B5-8137-9DF3F51BA10A}">
+      <p15:sldGuideLst xmlns:p15="http://schemas.microsoft.com/office/powerpoint/2012/main"/>
+    </p:ext>
+  </p:extLst>
 </p:presentation>
 </file>
 
@@ -254,7 +259,7 @@
           <a:p>
             <a:fld id="{5EA34C18-A96D-E842-81CF-128215D50AC1}" type="datetimeFigureOut">
               <a:rPr lang="en-US" smtClean="0"/>
-              <a:t>3/9/18</a:t>
+              <a:t>4/6/2018</a:t>
             </a:fld>
             <a:endParaRPr lang="en-US"/>
           </a:p>
@@ -452,7 +457,7 @@
           <a:p>
             <a:fld id="{5EA34C18-A96D-E842-81CF-128215D50AC1}" type="datetimeFigureOut">
               <a:rPr lang="en-US" smtClean="0"/>
-              <a:t>3/9/18</a:t>
+              <a:t>4/6/2018</a:t>
             </a:fld>
             <a:endParaRPr lang="en-US"/>
           </a:p>
@@ -660,7 +665,7 @@
           <a:p>
             <a:fld id="{5EA34C18-A96D-E842-81CF-128215D50AC1}" type="datetimeFigureOut">
               <a:rPr lang="en-US" smtClean="0"/>
-              <a:t>3/9/18</a:t>
+              <a:t>4/6/2018</a:t>
             </a:fld>
             <a:endParaRPr lang="en-US"/>
           </a:p>
@@ -858,7 +863,7 @@
           <a:p>
             <a:fld id="{5EA34C18-A96D-E842-81CF-128215D50AC1}" type="datetimeFigureOut">
               <a:rPr lang="en-US" smtClean="0"/>
-              <a:t>3/9/18</a:t>
+              <a:t>4/6/2018</a:t>
             </a:fld>
             <a:endParaRPr lang="en-US"/>
           </a:p>
@@ -1133,7 +1138,7 @@
           <a:p>
             <a:fld id="{5EA34C18-A96D-E842-81CF-128215D50AC1}" type="datetimeFigureOut">
               <a:rPr lang="en-US" smtClean="0"/>
-              <a:t>3/9/18</a:t>
+              <a:t>4/6/2018</a:t>
             </a:fld>
             <a:endParaRPr lang="en-US"/>
           </a:p>
@@ -1398,7 +1403,7 @@
           <a:p>
             <a:fld id="{5EA34C18-A96D-E842-81CF-128215D50AC1}" type="datetimeFigureOut">
               <a:rPr lang="en-US" smtClean="0"/>
-              <a:t>3/9/18</a:t>
+              <a:t>4/6/2018</a:t>
             </a:fld>
             <a:endParaRPr lang="en-US"/>
           </a:p>
@@ -1810,7 +1815,7 @@
           <a:p>
             <a:fld id="{5EA34C18-A96D-E842-81CF-128215D50AC1}" type="datetimeFigureOut">
               <a:rPr lang="en-US" smtClean="0"/>
-              <a:t>3/9/18</a:t>
+              <a:t>4/6/2018</a:t>
             </a:fld>
             <a:endParaRPr lang="en-US"/>
           </a:p>
@@ -1951,7 +1956,7 @@
           <a:p>
             <a:fld id="{5EA34C18-A96D-E842-81CF-128215D50AC1}" type="datetimeFigureOut">
               <a:rPr lang="en-US" smtClean="0"/>
-              <a:t>3/9/18</a:t>
+              <a:t>4/6/2018</a:t>
             </a:fld>
             <a:endParaRPr lang="en-US"/>
           </a:p>
@@ -2064,7 +2069,7 @@
           <a:p>
             <a:fld id="{5EA34C18-A96D-E842-81CF-128215D50AC1}" type="datetimeFigureOut">
               <a:rPr lang="en-US" smtClean="0"/>
-              <a:t>3/9/18</a:t>
+              <a:t>4/6/2018</a:t>
             </a:fld>
             <a:endParaRPr lang="en-US"/>
           </a:p>
@@ -2375,7 +2380,7 @@
           <a:p>
             <a:fld id="{5EA34C18-A96D-E842-81CF-128215D50AC1}" type="datetimeFigureOut">
               <a:rPr lang="en-US" smtClean="0"/>
-              <a:t>3/9/18</a:t>
+              <a:t>4/6/2018</a:t>
             </a:fld>
             <a:endParaRPr lang="en-US"/>
           </a:p>
@@ -2663,7 +2668,7 @@
           <a:p>
             <a:fld id="{5EA34C18-A96D-E842-81CF-128215D50AC1}" type="datetimeFigureOut">
               <a:rPr lang="en-US" smtClean="0"/>
-              <a:t>3/9/18</a:t>
+              <a:t>4/6/2018</a:t>
             </a:fld>
             <a:endParaRPr lang="en-US"/>
           </a:p>
@@ -2904,7 +2909,7 @@
           <a:p>
             <a:fld id="{5EA34C18-A96D-E842-81CF-128215D50AC1}" type="datetimeFigureOut">
               <a:rPr lang="en-US" smtClean="0"/>
-              <a:t>3/9/18</a:t>
+              <a:t>4/6/2018</a:t>
             </a:fld>
             <a:endParaRPr lang="en-US"/>
           </a:p>
@@ -3501,7 +3506,7 @@
         </p:nvSpPr>
         <p:spPr>
           <a:xfrm>
-            <a:off x="4321479" y="140174"/>
+            <a:off x="3452960" y="522218"/>
             <a:ext cx="1352811" cy="369332"/>
           </a:xfrm>
           <a:prstGeom prst="rect">
@@ -3536,7 +3541,7 @@
         </p:nvSpPr>
         <p:spPr>
           <a:xfrm>
-            <a:off x="4083485" y="977030"/>
+            <a:off x="3214966" y="1359074"/>
             <a:ext cx="1828800" cy="764088"/>
           </a:xfrm>
           <a:prstGeom prst="ellipse">
@@ -3585,7 +3590,7 @@
         </p:nvSpPr>
         <p:spPr>
           <a:xfrm>
-            <a:off x="4049045" y="2513670"/>
+            <a:off x="3180526" y="2895714"/>
             <a:ext cx="1716066" cy="713984"/>
           </a:xfrm>
           <a:prstGeom prst="ellipse">
@@ -3634,7 +3639,7 @@
         </p:nvSpPr>
         <p:spPr>
           <a:xfrm>
-            <a:off x="3958225" y="4459266"/>
+            <a:off x="3089706" y="4841310"/>
             <a:ext cx="2116898" cy="839244"/>
           </a:xfrm>
           <a:prstGeom prst="ellipse">
@@ -3686,7 +3691,7 @@
         </p:nvCxnSpPr>
         <p:spPr>
           <a:xfrm rot="5400000" flipH="1" flipV="1">
-            <a:off x="4618647" y="709690"/>
+            <a:off x="3750128" y="1091734"/>
             <a:ext cx="111898" cy="646578"/>
           </a:xfrm>
           <a:prstGeom prst="curvedConnector3">
@@ -3727,7 +3732,7 @@
         </p:nvSpPr>
         <p:spPr>
           <a:xfrm>
-            <a:off x="3762584" y="626301"/>
+            <a:off x="2894065" y="1008345"/>
             <a:ext cx="1177446" cy="369332"/>
           </a:xfrm>
           <a:prstGeom prst="rect">
@@ -3766,7 +3771,7 @@
         </p:nvCxnSpPr>
         <p:spPr>
           <a:xfrm rot="16200000" flipH="1">
-            <a:off x="3916821" y="1523414"/>
+            <a:off x="3048302" y="1905458"/>
             <a:ext cx="1424742" cy="555771"/>
           </a:xfrm>
           <a:prstGeom prst="curvedConnector5">
@@ -3812,7 +3817,7 @@
         </p:nvCxnSpPr>
         <p:spPr>
           <a:xfrm rot="16200000" flipH="1">
-            <a:off x="4658836" y="3475896"/>
+            <a:off x="3790317" y="3857940"/>
             <a:ext cx="1354516" cy="858032"/>
           </a:xfrm>
           <a:prstGeom prst="curvedConnector3">
@@ -3855,7 +3860,7 @@
         </p:nvCxnSpPr>
         <p:spPr>
           <a:xfrm rot="16200000" flipH="1">
-            <a:off x="5771757" y="4575523"/>
+            <a:off x="4903238" y="4957567"/>
             <a:ext cx="296718" cy="310013"/>
           </a:xfrm>
           <a:prstGeom prst="curvedConnector4">
@@ -3897,7 +3902,7 @@
         </p:nvSpPr>
         <p:spPr>
           <a:xfrm>
-            <a:off x="5661765" y="3882214"/>
+            <a:off x="4793246" y="4264258"/>
             <a:ext cx="1177446" cy="369332"/>
           </a:xfrm>
           <a:prstGeom prst="rect">
@@ -3936,7 +3941,7 @@
         </p:nvCxnSpPr>
         <p:spPr>
           <a:xfrm rot="5400000" flipH="1" flipV="1">
-            <a:off x="4909356" y="3726416"/>
+            <a:off x="4040837" y="4108460"/>
             <a:ext cx="1711508" cy="1"/>
           </a:xfrm>
           <a:prstGeom prst="curvedConnector4">
@@ -3981,7 +3986,7 @@
         </p:nvCxnSpPr>
         <p:spPr>
           <a:xfrm rot="5400000" flipH="1">
-            <a:off x="4551437" y="2872014"/>
+            <a:off x="3682918" y="3254058"/>
             <a:ext cx="104561" cy="606721"/>
           </a:xfrm>
           <a:prstGeom prst="curvedConnector3">
@@ -4022,7 +4027,7 @@
         </p:nvSpPr>
         <p:spPr>
           <a:xfrm>
-            <a:off x="4225983" y="3286223"/>
+            <a:off x="3357464" y="3668267"/>
             <a:ext cx="1221288" cy="369332"/>
           </a:xfrm>
           <a:prstGeom prst="rect">
@@ -4074,7 +4079,7 @@
           <a:p>
             <a:r>
               <a:rPr lang="en-US" dirty="0"/>
-              <a:t>Validate Worker</a:t>
+              <a:t>Listener Worker</a:t>
             </a:r>
           </a:p>
         </p:txBody>
@@ -4226,7 +4231,7 @@
         </p:nvCxnSpPr>
         <p:spPr>
           <a:xfrm rot="16200000" flipH="1">
-            <a:off x="5513239" y="2618790"/>
+            <a:off x="4644720" y="3000834"/>
             <a:ext cx="252431" cy="251312"/>
           </a:xfrm>
           <a:prstGeom prst="curvedConnector4">
@@ -4268,7 +4273,7 @@
         </p:nvSpPr>
         <p:spPr>
           <a:xfrm>
-            <a:off x="5311036" y="2041742"/>
+            <a:off x="4442517" y="2423786"/>
             <a:ext cx="1415441" cy="375781"/>
           </a:xfrm>
           <a:prstGeom prst="rect">
@@ -4292,10 +4297,10 @@
       </p:sp>
       <p:sp>
         <p:nvSpPr>
-          <p:cNvPr id="72" name="TextBox 71">
-            <a:extLst>
-              <a:ext uri="{FF2B5EF4-FFF2-40B4-BE49-F238E27FC236}">
-                <a16:creationId xmlns:a16="http://schemas.microsoft.com/office/drawing/2014/main" id="{DB9FC142-E004-154B-B5CD-8CD0FE750C1C}"/>
+          <p:cNvPr id="30" name="TextBox 29">
+            <a:extLst>
+              <a:ext uri="{FF2B5EF4-FFF2-40B4-BE49-F238E27FC236}">
+                <a16:creationId xmlns:a16="http://schemas.microsoft.com/office/drawing/2014/main" id="{3A785326-9AA9-48F9-8E62-38F3C4B53C36}"/>
               </a:ext>
             </a:extLst>
           </p:cNvPr>
@@ -4304,8 +4309,8 @@
         </p:nvSpPr>
         <p:spPr>
           <a:xfrm>
-            <a:off x="7828766" y="338203"/>
-            <a:ext cx="2054269" cy="369332"/>
+            <a:off x="5595307" y="146754"/>
+            <a:ext cx="1885899" cy="369332"/>
           </a:xfrm>
           <a:prstGeom prst="rect">
             <a:avLst/>
@@ -4320,17 +4325,17 @@
           <a:p>
             <a:r>
               <a:rPr lang="en-US" dirty="0"/>
-              <a:t>User Input Worker</a:t>
-            </a:r>
-          </a:p>
-        </p:txBody>
-      </p:sp>
-      <p:sp>
-        <p:nvSpPr>
-          <p:cNvPr id="73" name="Oval 72">
-            <a:extLst>
-              <a:ext uri="{FF2B5EF4-FFF2-40B4-BE49-F238E27FC236}">
-                <a16:creationId xmlns:a16="http://schemas.microsoft.com/office/drawing/2014/main" id="{76DED711-81D7-744D-8252-61A0A04DF4B1}"/>
+              <a:t>Outgoing Worker</a:t>
+            </a:r>
+          </a:p>
+        </p:txBody>
+      </p:sp>
+      <p:sp>
+        <p:nvSpPr>
+          <p:cNvPr id="31" name="Oval 30">
+            <a:extLst>
+              <a:ext uri="{FF2B5EF4-FFF2-40B4-BE49-F238E27FC236}">
+                <a16:creationId xmlns:a16="http://schemas.microsoft.com/office/drawing/2014/main" id="{48A7E364-991C-4AE6-90AE-053882DB47AE}"/>
               </a:ext>
             </a:extLst>
           </p:cNvPr>
@@ -4339,8 +4344,8 @@
         </p:nvSpPr>
         <p:spPr>
           <a:xfrm>
-            <a:off x="8016658" y="1088928"/>
-            <a:ext cx="1691013" cy="827554"/>
+            <a:off x="5595307" y="972372"/>
+            <a:ext cx="1678487" cy="856079"/>
           </a:xfrm>
           <a:prstGeom prst="ellipse">
             <a:avLst/>
@@ -4376,28 +4381,28 @@
       </p:sp>
       <p:cxnSp>
         <p:nvCxnSpPr>
-          <p:cNvPr id="75" name="Curved Connector 74">
-            <a:extLst>
-              <a:ext uri="{FF2B5EF4-FFF2-40B4-BE49-F238E27FC236}">
-                <a16:creationId xmlns:a16="http://schemas.microsoft.com/office/drawing/2014/main" id="{195F474F-3325-3F4E-9FF0-412BC30CED88}"/>
+          <p:cNvPr id="33" name="Curved Connector 62">
+            <a:extLst>
+              <a:ext uri="{FF2B5EF4-FFF2-40B4-BE49-F238E27FC236}">
+                <a16:creationId xmlns:a16="http://schemas.microsoft.com/office/drawing/2014/main" id="{734079BA-745C-4E66-9A6E-975F9BE88AA0}"/>
               </a:ext>
             </a:extLst>
           </p:cNvPr>
           <p:cNvCxnSpPr>
-            <a:stCxn id="73" idx="4"/>
-            <a:endCxn id="73" idx="6"/>
+            <a:stCxn id="31" idx="4"/>
+            <a:endCxn id="31" idx="6"/>
           </p:cNvCxnSpPr>
           <p:nvPr/>
         </p:nvCxnSpPr>
         <p:spPr>
           <a:xfrm rot="5400000" flipH="1" flipV="1">
-            <a:off x="9078029" y="1286841"/>
-            <a:ext cx="413777" cy="845506"/>
+            <a:off x="6640152" y="1194810"/>
+            <a:ext cx="428039" cy="839243"/>
           </a:xfrm>
           <a:prstGeom prst="curvedConnector4">
             <a:avLst>
-              <a:gd name="adj1" fmla="val -55247"/>
-              <a:gd name="adj2" fmla="val 127037"/>
+              <a:gd name="adj1" fmla="val -53406"/>
+              <a:gd name="adj2" fmla="val 127239"/>
             </a:avLst>
           </a:prstGeom>
           <a:ln>
@@ -4421,10 +4426,10 @@
       </p:cxnSp>
       <p:sp>
         <p:nvSpPr>
-          <p:cNvPr id="76" name="TextBox 75">
-            <a:extLst>
-              <a:ext uri="{FF2B5EF4-FFF2-40B4-BE49-F238E27FC236}">
-                <a16:creationId xmlns:a16="http://schemas.microsoft.com/office/drawing/2014/main" id="{E343B3C7-25CB-D64D-BFB1-47501023CA9B}"/>
+          <p:cNvPr id="35" name="TextBox 34">
+            <a:extLst>
+              <a:ext uri="{FF2B5EF4-FFF2-40B4-BE49-F238E27FC236}">
+                <a16:creationId xmlns:a16="http://schemas.microsoft.com/office/drawing/2014/main" id="{C0EA0141-A08D-49E1-BEA5-521E456C1CAD}"/>
               </a:ext>
             </a:extLst>
           </p:cNvPr>
@@ -4433,8 +4438,8 @@
         </p:nvSpPr>
         <p:spPr>
           <a:xfrm>
-            <a:off x="9021865" y="2167003"/>
-            <a:ext cx="1487472" cy="369332"/>
+            <a:off x="6634967" y="2078986"/>
+            <a:ext cx="1390389" cy="369332"/>
           </a:xfrm>
           <a:prstGeom prst="rect">
             <a:avLst/>
@@ -4457,10 +4462,10 @@
       </p:sp>
       <p:sp>
         <p:nvSpPr>
-          <p:cNvPr id="77" name="TextBox 76">
-            <a:extLst>
-              <a:ext uri="{FF2B5EF4-FFF2-40B4-BE49-F238E27FC236}">
-                <a16:creationId xmlns:a16="http://schemas.microsoft.com/office/drawing/2014/main" id="{BCAC114F-D185-454E-A01A-CB0DF8BBEE36}"/>
+          <p:cNvPr id="42" name="TextBox 41">
+            <a:extLst>
+              <a:ext uri="{FF2B5EF4-FFF2-40B4-BE49-F238E27FC236}">
+                <a16:creationId xmlns:a16="http://schemas.microsoft.com/office/drawing/2014/main" id="{1292229F-029E-4EAC-B4FE-E81C3C595FD8}"/>
               </a:ext>
             </a:extLst>
           </p:cNvPr>
@@ -4469,8 +4474,8 @@
         </p:nvSpPr>
         <p:spPr>
           <a:xfrm>
-            <a:off x="7615825" y="3123094"/>
-            <a:ext cx="4196219" cy="1384995"/>
+            <a:off x="5887699" y="2912652"/>
+            <a:ext cx="1885899" cy="369332"/>
           </a:xfrm>
           <a:prstGeom prst="rect">
             <a:avLst/>
@@ -4484,9 +4489,304 @@
           <a:lstStyle/>
           <a:p>
             <a:r>
-              <a:rPr lang="en-US" sz="1200" dirty="0"/>
-              <a:t>The client has these workers in it. The peer worker makes sure to maintain a minimum number of connections. The user input worker waits for input from the player. The draw worker draws the events it receives. The validate worker is the real meat of the operation. It receives events from both users and peers, and tries to validate them. User events are trusted over the rest of the network.</a:t>
-            </a:r>
+              <a:rPr lang="en-US" dirty="0"/>
+              <a:t>Heartbeat Worker</a:t>
+            </a:r>
+          </a:p>
+        </p:txBody>
+      </p:sp>
+      <p:sp>
+        <p:nvSpPr>
+          <p:cNvPr id="43" name="Oval 42">
+            <a:extLst>
+              <a:ext uri="{FF2B5EF4-FFF2-40B4-BE49-F238E27FC236}">
+                <a16:creationId xmlns:a16="http://schemas.microsoft.com/office/drawing/2014/main" id="{27E12D8E-7025-4647-8246-E9B1CD53FE26}"/>
+              </a:ext>
+            </a:extLst>
+          </p:cNvPr>
+          <p:cNvSpPr/>
+          <p:nvPr/>
+        </p:nvSpPr>
+        <p:spPr>
+          <a:xfrm>
+            <a:off x="5887699" y="3738270"/>
+            <a:ext cx="1678487" cy="856079"/>
+          </a:xfrm>
+          <a:prstGeom prst="ellipse">
+            <a:avLst/>
+          </a:prstGeom>
+        </p:spPr>
+        <p:style>
+          <a:lnRef idx="2">
+            <a:schemeClr val="accent1">
+              <a:shade val="50000"/>
+            </a:schemeClr>
+          </a:lnRef>
+          <a:fillRef idx="1">
+            <a:schemeClr val="accent1"/>
+          </a:fillRef>
+          <a:effectRef idx="0">
+            <a:schemeClr val="accent1"/>
+          </a:effectRef>
+          <a:fontRef idx="minor">
+            <a:schemeClr val="lt1"/>
+          </a:fontRef>
+        </p:style>
+        <p:txBody>
+          <a:bodyPr rtlCol="0" anchor="ctr"/>
+          <a:lstStyle/>
+          <a:p>
+            <a:pPr algn="ctr"/>
+            <a:r>
+              <a:rPr lang="en-US" dirty="0"/>
+              <a:t>Wait</a:t>
+            </a:r>
+          </a:p>
+        </p:txBody>
+      </p:sp>
+      <p:cxnSp>
+        <p:nvCxnSpPr>
+          <p:cNvPr id="44" name="Curved Connector 62">
+            <a:extLst>
+              <a:ext uri="{FF2B5EF4-FFF2-40B4-BE49-F238E27FC236}">
+                <a16:creationId xmlns:a16="http://schemas.microsoft.com/office/drawing/2014/main" id="{9C0254B1-31F8-493B-BF53-5DA08AEFA767}"/>
+              </a:ext>
+            </a:extLst>
+          </p:cNvPr>
+          <p:cNvCxnSpPr>
+            <a:stCxn id="43" idx="4"/>
+            <a:endCxn id="43" idx="6"/>
+          </p:cNvCxnSpPr>
+          <p:nvPr/>
+        </p:nvCxnSpPr>
+        <p:spPr>
+          <a:xfrm rot="5400000" flipH="1" flipV="1">
+            <a:off x="6932544" y="3960708"/>
+            <a:ext cx="428039" cy="839243"/>
+          </a:xfrm>
+          <a:prstGeom prst="curvedConnector4">
+            <a:avLst>
+              <a:gd name="adj1" fmla="val -53406"/>
+              <a:gd name="adj2" fmla="val 127239"/>
+            </a:avLst>
+          </a:prstGeom>
+          <a:ln>
+            <a:tailEnd type="triangle"/>
+          </a:ln>
+        </p:spPr>
+        <p:style>
+          <a:lnRef idx="1">
+            <a:schemeClr val="accent1"/>
+          </a:lnRef>
+          <a:fillRef idx="0">
+            <a:schemeClr val="accent1"/>
+          </a:fillRef>
+          <a:effectRef idx="0">
+            <a:schemeClr val="accent1"/>
+          </a:effectRef>
+          <a:fontRef idx="minor">
+            <a:schemeClr val="tx1"/>
+          </a:fontRef>
+        </p:style>
+      </p:cxnSp>
+      <p:sp>
+        <p:nvSpPr>
+          <p:cNvPr id="45" name="TextBox 44">
+            <a:extLst>
+              <a:ext uri="{FF2B5EF4-FFF2-40B4-BE49-F238E27FC236}">
+                <a16:creationId xmlns:a16="http://schemas.microsoft.com/office/drawing/2014/main" id="{A0973B59-49C1-489F-B010-08FBAC976E7E}"/>
+              </a:ext>
+            </a:extLst>
+          </p:cNvPr>
+          <p:cNvSpPr txBox="1"/>
+          <p:nvPr/>
+        </p:nvSpPr>
+        <p:spPr>
+          <a:xfrm>
+            <a:off x="6927359" y="4844884"/>
+            <a:ext cx="1390389" cy="369332"/>
+          </a:xfrm>
+          <a:prstGeom prst="rect">
+            <a:avLst/>
+          </a:prstGeom>
+          <a:noFill/>
+        </p:spPr>
+        <p:txBody>
+          <a:bodyPr wrap="square" rtlCol="0">
+            <a:spAutoFit/>
+          </a:bodyPr>
+          <a:lstStyle/>
+          <a:p>
+            <a:r>
+              <a:rPr lang="en-US" dirty="0" err="1"/>
+              <a:t>tryHeartbeat</a:t>
+            </a:r>
+            <a:endParaRPr lang="en-US" dirty="0"/>
+          </a:p>
+        </p:txBody>
+      </p:sp>
+      <p:sp>
+        <p:nvSpPr>
+          <p:cNvPr id="48" name="TextBox 47">
+            <a:extLst>
+              <a:ext uri="{FF2B5EF4-FFF2-40B4-BE49-F238E27FC236}">
+                <a16:creationId xmlns:a16="http://schemas.microsoft.com/office/drawing/2014/main" id="{BCBA5012-001B-48AC-B329-55A4530D8E89}"/>
+              </a:ext>
+            </a:extLst>
+          </p:cNvPr>
+          <p:cNvSpPr txBox="1"/>
+          <p:nvPr/>
+        </p:nvSpPr>
+        <p:spPr>
+          <a:xfrm>
+            <a:off x="8590751" y="2251480"/>
+            <a:ext cx="2150821" cy="369332"/>
+          </a:xfrm>
+          <a:prstGeom prst="rect">
+            <a:avLst/>
+          </a:prstGeom>
+          <a:noFill/>
+        </p:spPr>
+        <p:txBody>
+          <a:bodyPr wrap="square" rtlCol="0">
+            <a:spAutoFit/>
+          </a:bodyPr>
+          <a:lstStyle/>
+          <a:p>
+            <a:r>
+              <a:rPr lang="en-US" dirty="0"/>
+              <a:t>Heartbeat Monitor</a:t>
+            </a:r>
+          </a:p>
+        </p:txBody>
+      </p:sp>
+      <p:sp>
+        <p:nvSpPr>
+          <p:cNvPr id="49" name="Oval 48">
+            <a:extLst>
+              <a:ext uri="{FF2B5EF4-FFF2-40B4-BE49-F238E27FC236}">
+                <a16:creationId xmlns:a16="http://schemas.microsoft.com/office/drawing/2014/main" id="{B38ABAB1-26E8-4D35-82DF-5EAC17D6C0C6}"/>
+              </a:ext>
+            </a:extLst>
+          </p:cNvPr>
+          <p:cNvSpPr/>
+          <p:nvPr/>
+        </p:nvSpPr>
+        <p:spPr>
+          <a:xfrm>
+            <a:off x="8590751" y="3077098"/>
+            <a:ext cx="1678487" cy="856079"/>
+          </a:xfrm>
+          <a:prstGeom prst="ellipse">
+            <a:avLst/>
+          </a:prstGeom>
+        </p:spPr>
+        <p:style>
+          <a:lnRef idx="2">
+            <a:schemeClr val="accent1">
+              <a:shade val="50000"/>
+            </a:schemeClr>
+          </a:lnRef>
+          <a:fillRef idx="1">
+            <a:schemeClr val="accent1"/>
+          </a:fillRef>
+          <a:effectRef idx="0">
+            <a:schemeClr val="accent1"/>
+          </a:effectRef>
+          <a:fontRef idx="minor">
+            <a:schemeClr val="lt1"/>
+          </a:fontRef>
+        </p:style>
+        <p:txBody>
+          <a:bodyPr rtlCol="0" anchor="ctr"/>
+          <a:lstStyle/>
+          <a:p>
+            <a:pPr algn="ctr"/>
+            <a:r>
+              <a:rPr lang="en-US" dirty="0"/>
+              <a:t>Wait</a:t>
+            </a:r>
+          </a:p>
+        </p:txBody>
+      </p:sp>
+      <p:cxnSp>
+        <p:nvCxnSpPr>
+          <p:cNvPr id="50" name="Curved Connector 62">
+            <a:extLst>
+              <a:ext uri="{FF2B5EF4-FFF2-40B4-BE49-F238E27FC236}">
+                <a16:creationId xmlns:a16="http://schemas.microsoft.com/office/drawing/2014/main" id="{A5E67290-75CF-4545-80E5-F6DEAA29532B}"/>
+              </a:ext>
+            </a:extLst>
+          </p:cNvPr>
+          <p:cNvCxnSpPr>
+            <a:stCxn id="49" idx="4"/>
+            <a:endCxn id="49" idx="6"/>
+          </p:cNvCxnSpPr>
+          <p:nvPr/>
+        </p:nvCxnSpPr>
+        <p:spPr>
+          <a:xfrm rot="5400000" flipH="1" flipV="1">
+            <a:off x="9635596" y="3299536"/>
+            <a:ext cx="428039" cy="839243"/>
+          </a:xfrm>
+          <a:prstGeom prst="curvedConnector4">
+            <a:avLst>
+              <a:gd name="adj1" fmla="val -53406"/>
+              <a:gd name="adj2" fmla="val 127239"/>
+            </a:avLst>
+          </a:prstGeom>
+          <a:ln>
+            <a:tailEnd type="triangle"/>
+          </a:ln>
+        </p:spPr>
+        <p:style>
+          <a:lnRef idx="1">
+            <a:schemeClr val="accent1"/>
+          </a:lnRef>
+          <a:fillRef idx="0">
+            <a:schemeClr val="accent1"/>
+          </a:fillRef>
+          <a:effectRef idx="0">
+            <a:schemeClr val="accent1"/>
+          </a:effectRef>
+          <a:fontRef idx="minor">
+            <a:schemeClr val="tx1"/>
+          </a:fontRef>
+        </p:style>
+      </p:cxnSp>
+      <p:sp>
+        <p:nvSpPr>
+          <p:cNvPr id="51" name="TextBox 50">
+            <a:extLst>
+              <a:ext uri="{FF2B5EF4-FFF2-40B4-BE49-F238E27FC236}">
+                <a16:creationId xmlns:a16="http://schemas.microsoft.com/office/drawing/2014/main" id="{9F93CE92-7965-4815-A191-DBF3E3512BC0}"/>
+              </a:ext>
+            </a:extLst>
+          </p:cNvPr>
+          <p:cNvSpPr txBox="1"/>
+          <p:nvPr/>
+        </p:nvSpPr>
+        <p:spPr>
+          <a:xfrm>
+            <a:off x="9259626" y="4183712"/>
+            <a:ext cx="1761175" cy="369332"/>
+          </a:xfrm>
+          <a:prstGeom prst="rect">
+            <a:avLst/>
+          </a:prstGeom>
+          <a:noFill/>
+        </p:spPr>
+        <p:txBody>
+          <a:bodyPr wrap="square" rtlCol="0">
+            <a:spAutoFit/>
+          </a:bodyPr>
+          <a:lstStyle/>
+          <a:p>
+            <a:r>
+              <a:rPr lang="en-US" dirty="0" err="1"/>
+              <a:t>verifyHeartbeats</a:t>
+            </a:r>
+            <a:endParaRPr lang="en-US" dirty="0"/>
           </a:p>
         </p:txBody>
       </p:sp>

</xml_diff>